<commit_message>
fix bugs for force only clustering
</commit_message>
<xml_diff>
--- a/presentation/kickoff.pptx
+++ b/presentation/kickoff.pptx
@@ -228,7 +228,7 @@
           <a:p>
             <a:fld id="{0F76751C-F863-4AB7-BFCC-A69EBD0CB6E7}" type="datetimeFigureOut">
               <a:rPr lang="zh-CN" altLang="en-US" smtClean="0"/>
-              <a:t>2019/4/25</a:t>
+              <a:t>2019/8/28</a:t>
             </a:fld>
             <a:endParaRPr lang="zh-CN" altLang="en-US"/>
           </a:p>
@@ -394,7 +394,7 @@
           <a:p>
             <a:fld id="{C9A26571-6BBA-4313-89AD-67CDB92B6AC1}" type="datetimeFigureOut">
               <a:rPr lang="zh-CN" altLang="en-US" smtClean="0"/>
-              <a:t>2019/4/25</a:t>
+              <a:t>2019/8/28</a:t>
             </a:fld>
             <a:endParaRPr lang="zh-CN" altLang="en-US"/>
           </a:p>
@@ -881,7 +881,7 @@
           <a:p>
             <a:fld id="{5FEBCCCB-4DC8-4760-84F4-A72FBD3C22ED}" type="datetime1">
               <a:rPr lang="en-US" altLang="zh-CN" smtClean="0"/>
-              <a:t>4/25/19</a:t>
+              <a:t>8/28/19</a:t>
             </a:fld>
             <a:endParaRPr lang="zh-CN" altLang="en-US" dirty="0"/>
           </a:p>
@@ -1103,7 +1103,7 @@
           <a:p>
             <a:fld id="{F9BC29B6-4A95-470C-8213-EF090C2521B5}" type="datetime1">
               <a:rPr lang="en-US" altLang="zh-CN" smtClean="0"/>
-              <a:t>4/25/19</a:t>
+              <a:t>8/28/19</a:t>
             </a:fld>
             <a:endParaRPr lang="zh-CN" altLang="en-US"/>
           </a:p>
@@ -1287,7 +1287,7 @@
           <a:p>
             <a:fld id="{6D61A157-CAFE-42C3-B1D5-31BAB3FFC042}" type="datetime1">
               <a:rPr lang="en-US" altLang="zh-CN" smtClean="0"/>
-              <a:t>4/25/19</a:t>
+              <a:t>8/28/19</a:t>
             </a:fld>
             <a:endParaRPr lang="zh-CN" altLang="en-US"/>
           </a:p>
@@ -1486,7 +1486,7 @@
           <a:p>
             <a:fld id="{7744E5FA-A195-4433-A90B-923A92DA781B}" type="datetime1">
               <a:rPr lang="en-US" altLang="zh-CN" smtClean="0"/>
-              <a:t>4/25/19</a:t>
+              <a:t>8/28/19</a:t>
             </a:fld>
             <a:endParaRPr lang="zh-CN" altLang="en-US" dirty="0"/>
           </a:p>
@@ -1760,7 +1760,7 @@
           <a:p>
             <a:fld id="{DDAC0AAC-C4D7-4480-8918-339E8D7362F3}" type="datetime1">
               <a:rPr lang="en-US" altLang="zh-CN" smtClean="0"/>
-              <a:t>4/25/19</a:t>
+              <a:t>8/28/19</a:t>
             </a:fld>
             <a:endParaRPr lang="zh-CN" altLang="en-US"/>
           </a:p>
@@ -1996,7 +1996,7 @@
           <a:p>
             <a:fld id="{4A1402A4-40E1-4E2C-8B6E-BBD08C96D4F0}" type="datetime1">
               <a:rPr lang="en-US" altLang="zh-CN" smtClean="0"/>
-              <a:t>4/25/19</a:t>
+              <a:t>8/28/19</a:t>
             </a:fld>
             <a:endParaRPr lang="zh-CN" altLang="en-US"/>
           </a:p>
@@ -2367,7 +2367,7 @@
           <a:p>
             <a:fld id="{678EBD7D-0CC5-46FE-A710-0921F6E50522}" type="datetime1">
               <a:rPr lang="en-US" altLang="zh-CN" smtClean="0"/>
-              <a:t>4/25/19</a:t>
+              <a:t>8/28/19</a:t>
             </a:fld>
             <a:endParaRPr lang="zh-CN" altLang="en-US"/>
           </a:p>
@@ -2489,7 +2489,7 @@
           <a:p>
             <a:fld id="{FCDB9FE6-6D71-4BE1-837C-F4E8435E96DE}" type="datetime1">
               <a:rPr lang="en-US" altLang="zh-CN" smtClean="0"/>
-              <a:t>4/25/19</a:t>
+              <a:t>8/28/19</a:t>
             </a:fld>
             <a:endParaRPr lang="zh-CN" altLang="en-US"/>
           </a:p>
@@ -2588,7 +2588,7 @@
           <a:p>
             <a:fld id="{4F81BBAC-6A0C-46A5-AFE8-65E8104AE22D}" type="datetime1">
               <a:rPr lang="en-US" altLang="zh-CN" smtClean="0"/>
-              <a:t>4/25/19</a:t>
+              <a:t>8/28/19</a:t>
             </a:fld>
             <a:endParaRPr lang="zh-CN" altLang="en-US"/>
           </a:p>
@@ -2869,7 +2869,7 @@
           <a:p>
             <a:fld id="{7F9B4EA6-DCA8-4CA0-B70E-5ADA6AE3296D}" type="datetime1">
               <a:rPr lang="en-US" altLang="zh-CN" smtClean="0"/>
-              <a:t>4/25/19</a:t>
+              <a:t>8/28/19</a:t>
             </a:fld>
             <a:endParaRPr lang="zh-CN" altLang="en-US"/>
           </a:p>
@@ -3130,7 +3130,7 @@
           <a:p>
             <a:fld id="{ACC16FC4-4F10-425C-95F6-B55FB7FEBEC7}" type="datetime1">
               <a:rPr lang="en-US" altLang="zh-CN" smtClean="0"/>
-              <a:t>4/25/19</a:t>
+              <a:t>8/28/19</a:t>
             </a:fld>
             <a:endParaRPr lang="zh-CN" altLang="en-US"/>
           </a:p>
@@ -3347,7 +3347,7 @@
           <a:p>
             <a:fld id="{2F2E2757-CE37-4261-A334-0DD91C52C11F}" type="datetime1">
               <a:rPr lang="en-US" altLang="zh-CN" smtClean="0"/>
-              <a:t>4/25/19</a:t>
+              <a:t>8/28/19</a:t>
             </a:fld>
             <a:endParaRPr lang="zh-CN" altLang="en-US"/>
           </a:p>
@@ -3967,7 +3967,7 @@
           <a:p>
             <a:fld id="{578B4AB8-4A47-47A2-B32C-947DC5DA889C}" type="datetime1">
               <a:rPr lang="en-US" altLang="zh-CN" smtClean="0"/>
-              <a:t>4/25/19</a:t>
+              <a:t>8/28/19</a:t>
             </a:fld>
             <a:endParaRPr lang="zh-CN" altLang="en-US" dirty="0"/>
           </a:p>
@@ -4026,7 +4026,7 @@
           <a:p>
             <a:fld id="{7744E5FA-A195-4433-A90B-923A92DA781B}" type="datetime1">
               <a:rPr lang="en-US" altLang="zh-CN" smtClean="0"/>
-              <a:t>4/25/19</a:t>
+              <a:t>8/28/19</a:t>
             </a:fld>
             <a:endParaRPr lang="zh-CN" altLang="en-US" dirty="0"/>
           </a:p>
@@ -5249,7 +5249,7 @@
           <a:p>
             <a:fld id="{7744E5FA-A195-4433-A90B-923A92DA781B}" type="datetime1">
               <a:rPr lang="en-US" altLang="zh-CN" smtClean="0"/>
-              <a:t>4/25/19</a:t>
+              <a:t>8/28/19</a:t>
             </a:fld>
             <a:endParaRPr lang="zh-CN" altLang="en-US" dirty="0"/>
           </a:p>
@@ -5394,41 +5394,12 @@
           </a:p>
         </p:txBody>
       </p:sp>
-      <p:pic>
-        <p:nvPicPr>
-          <p:cNvPr id="40" name="Picture 39">
+      <p:grpSp>
+        <p:nvGrpSpPr>
+          <p:cNvPr id="4" name="Group 3">
             <a:extLst>
               <a:ext uri="{FF2B5EF4-FFF2-40B4-BE49-F238E27FC236}">
-                <a16:creationId xmlns:a16="http://schemas.microsoft.com/office/drawing/2014/main" id="{2EAFE9D1-DA40-6E42-B4B2-41D87F45919E}"/>
-              </a:ext>
-            </a:extLst>
-          </p:cNvPr>
-          <p:cNvPicPr>
-            <a:picLocks noChangeAspect="1"/>
-          </p:cNvPicPr>
-          <p:nvPr/>
-        </p:nvPicPr>
-        <p:blipFill rotWithShape="1">
-          <a:blip r:embed="rId2"/>
-          <a:srcRect t="48004" r="10529" b="19588"/>
-          <a:stretch/>
-        </p:blipFill>
-        <p:spPr>
-          <a:xfrm>
-            <a:off x="637616" y="1458561"/>
-            <a:ext cx="5599421" cy="930899"/>
-          </a:xfrm>
-          <a:prstGeom prst="rect">
-            <a:avLst/>
-          </a:prstGeom>
-        </p:spPr>
-      </p:pic>
-      <p:grpSp>
-        <p:nvGrpSpPr>
-          <p:cNvPr id="77" name="Group 76">
-            <a:extLst>
-              <a:ext uri="{FF2B5EF4-FFF2-40B4-BE49-F238E27FC236}">
-                <a16:creationId xmlns:a16="http://schemas.microsoft.com/office/drawing/2014/main" id="{59495817-0195-354B-BED2-3EEE514F383F}"/>
+                <a16:creationId xmlns:a16="http://schemas.microsoft.com/office/drawing/2014/main" id="{E77E1BC0-4446-1249-834D-767D1D876BA6}"/>
               </a:ext>
             </a:extLst>
           </p:cNvPr>
@@ -5437,151 +5408,47 @@
         </p:nvGrpSpPr>
         <p:grpSpPr>
           <a:xfrm>
-            <a:off x="674510" y="1680278"/>
-            <a:ext cx="5526022" cy="670951"/>
-            <a:chOff x="674510" y="1680278"/>
-            <a:chExt cx="5526022" cy="670951"/>
+            <a:off x="637616" y="1458561"/>
+            <a:ext cx="5599421" cy="930899"/>
+            <a:chOff x="637616" y="1458561"/>
+            <a:chExt cx="5599421" cy="930899"/>
           </a:xfrm>
         </p:grpSpPr>
-        <p:sp>
-          <p:nvSpPr>
-            <p:cNvPr id="43" name="Rectangle 42">
+        <p:pic>
+          <p:nvPicPr>
+            <p:cNvPr id="40" name="Picture 39">
               <a:extLst>
                 <a:ext uri="{FF2B5EF4-FFF2-40B4-BE49-F238E27FC236}">
-                  <a16:creationId xmlns:a16="http://schemas.microsoft.com/office/drawing/2014/main" id="{D2F3AA70-40F5-A84E-ABC8-33EB6029A5E7}"/>
+                  <a16:creationId xmlns:a16="http://schemas.microsoft.com/office/drawing/2014/main" id="{2EAFE9D1-DA40-6E42-B4B2-41D87F45919E}"/>
                 </a:ext>
               </a:extLst>
             </p:cNvPr>
-            <p:cNvSpPr/>
+            <p:cNvPicPr>
+              <a:picLocks noChangeAspect="1"/>
+            </p:cNvPicPr>
             <p:nvPr/>
-          </p:nvSpPr>
+          </p:nvPicPr>
+          <p:blipFill rotWithShape="1">
+            <a:blip r:embed="rId2"/>
+            <a:srcRect t="48004" r="10529" b="19588"/>
+            <a:stretch/>
+          </p:blipFill>
           <p:spPr>
             <a:xfrm>
-              <a:off x="1661295" y="1680410"/>
-              <a:ext cx="3614061" cy="301752"/>
+              <a:off x="637616" y="1458561"/>
+              <a:ext cx="5599421" cy="930899"/>
             </a:xfrm>
             <a:prstGeom prst="rect">
               <a:avLst/>
             </a:prstGeom>
-            <a:solidFill>
-              <a:srgbClr val="F52403">
-                <a:alpha val="50000"/>
-              </a:srgbClr>
-            </a:solidFill>
-            <a:ln>
-              <a:noFill/>
-            </a:ln>
           </p:spPr>
-          <p:style>
-            <a:lnRef idx="2">
-              <a:schemeClr val="accent1">
-                <a:shade val="50000"/>
-              </a:schemeClr>
-            </a:lnRef>
-            <a:fillRef idx="1">
-              <a:schemeClr val="accent1"/>
-            </a:fillRef>
-            <a:effectRef idx="0">
-              <a:schemeClr val="accent1"/>
-            </a:effectRef>
-            <a:fontRef idx="minor">
-              <a:schemeClr val="lt1"/>
-            </a:fontRef>
-          </p:style>
-          <p:txBody>
-            <a:bodyPr rtlCol="0" anchor="ctr"/>
-            <a:lstStyle/>
-            <a:p>
-              <a:pPr algn="ctr"/>
-              <a:r>
-                <a:rPr lang="en-US" altLang="zh-CN" dirty="0"/>
-                <a:t>TOP</a:t>
-              </a:r>
-              <a:r>
-                <a:rPr lang="zh-CN" altLang="en-US" dirty="0"/>
-                <a:t> </a:t>
-              </a:r>
-              <a:r>
-                <a:rPr lang="en-US" altLang="zh-CN" dirty="0"/>
-                <a:t>BALLAST</a:t>
-              </a:r>
-              <a:endParaRPr lang="en-US" dirty="0"/>
-            </a:p>
-          </p:txBody>
-        </p:sp>
-        <p:sp>
-          <p:nvSpPr>
-            <p:cNvPr id="46" name="Rectangle 45">
+        </p:pic>
+        <p:grpSp>
+          <p:nvGrpSpPr>
+            <p:cNvPr id="77" name="Group 76">
               <a:extLst>
                 <a:ext uri="{FF2B5EF4-FFF2-40B4-BE49-F238E27FC236}">
-                  <a16:creationId xmlns:a16="http://schemas.microsoft.com/office/drawing/2014/main" id="{85016916-DEF2-7341-9500-F22C6FEA1D55}"/>
-                </a:ext>
-              </a:extLst>
-            </p:cNvPr>
-            <p:cNvSpPr/>
-            <p:nvPr/>
-          </p:nvSpPr>
-          <p:spPr>
-            <a:xfrm>
-              <a:off x="1661295" y="1981898"/>
-              <a:ext cx="3614061" cy="301752"/>
-            </a:xfrm>
-            <a:prstGeom prst="rect">
-              <a:avLst/>
-            </a:prstGeom>
-            <a:solidFill>
-              <a:schemeClr val="accent6">
-                <a:lumMod val="75000"/>
-                <a:alpha val="50000"/>
-              </a:schemeClr>
-            </a:solidFill>
-            <a:ln>
-              <a:noFill/>
-            </a:ln>
-          </p:spPr>
-          <p:style>
-            <a:lnRef idx="2">
-              <a:schemeClr val="accent1">
-                <a:shade val="50000"/>
-              </a:schemeClr>
-            </a:lnRef>
-            <a:fillRef idx="1">
-              <a:schemeClr val="accent1"/>
-            </a:fillRef>
-            <a:effectRef idx="0">
-              <a:schemeClr val="accent1"/>
-            </a:effectRef>
-            <a:fontRef idx="minor">
-              <a:schemeClr val="lt1"/>
-            </a:fontRef>
-          </p:style>
-          <p:txBody>
-            <a:bodyPr rtlCol="0" anchor="ctr"/>
-            <a:lstStyle/>
-            <a:p>
-              <a:pPr algn="ctr"/>
-              <a:r>
-                <a:rPr lang="en-US" altLang="zh-CN" dirty="0"/>
-                <a:t>BOTTOM</a:t>
-              </a:r>
-              <a:r>
-                <a:rPr lang="zh-CN" altLang="en-US" dirty="0"/>
-                <a:t> </a:t>
-              </a:r>
-              <a:r>
-                <a:rPr lang="en-US" altLang="zh-CN" dirty="0"/>
-                <a:t>BALLAST</a:t>
-              </a:r>
-              <a:endParaRPr lang="en-US" dirty="0"/>
-            </a:p>
-          </p:txBody>
-        </p:sp>
-        <p:grpSp>
-          <p:nvGrpSpPr>
-            <p:cNvPr id="57" name="Group 56">
-              <a:extLst>
-                <a:ext uri="{FF2B5EF4-FFF2-40B4-BE49-F238E27FC236}">
-                  <a16:creationId xmlns:a16="http://schemas.microsoft.com/office/drawing/2014/main" id="{3ADBC7F4-E301-6145-852F-A542EFB803E8}"/>
+                  <a16:creationId xmlns:a16="http://schemas.microsoft.com/office/drawing/2014/main" id="{59495817-0195-354B-BED2-3EEE514F383F}"/>
                 </a:ext>
               </a:extLst>
             </p:cNvPr>
@@ -5590,18 +5457,18 @@
           </p:nvGrpSpPr>
           <p:grpSpPr>
             <a:xfrm>
-              <a:off x="5275356" y="1680410"/>
-              <a:ext cx="925176" cy="603240"/>
-              <a:chOff x="5275355" y="1829433"/>
-              <a:chExt cx="925176" cy="603240"/>
+              <a:off x="674510" y="1680278"/>
+              <a:ext cx="5526022" cy="670951"/>
+              <a:chOff x="674510" y="1680278"/>
+              <a:chExt cx="5526022" cy="670951"/>
             </a:xfrm>
           </p:grpSpPr>
           <p:sp>
             <p:nvSpPr>
-              <p:cNvPr id="50" name="Rectangle 49">
+              <p:cNvPr id="43" name="Rectangle 42">
                 <a:extLst>
                   <a:ext uri="{FF2B5EF4-FFF2-40B4-BE49-F238E27FC236}">
-                    <a16:creationId xmlns:a16="http://schemas.microsoft.com/office/drawing/2014/main" id="{664D51BD-F0D7-EF46-9ADA-142A69C98F61}"/>
+                    <a16:creationId xmlns:a16="http://schemas.microsoft.com/office/drawing/2014/main" id="{D2F3AA70-40F5-A84E-ABC8-33EB6029A5E7}"/>
                   </a:ext>
                 </a:extLst>
               </p:cNvPr>
@@ -5610,11 +5477,781 @@
             </p:nvSpPr>
             <p:spPr>
               <a:xfrm>
-                <a:off x="5275355" y="1829433"/>
-                <a:ext cx="87316" cy="603240"/>
+                <a:off x="1661295" y="1680410"/>
+                <a:ext cx="3614061" cy="301752"/>
               </a:xfrm>
               <a:prstGeom prst="rect">
                 <a:avLst/>
+              </a:prstGeom>
+              <a:solidFill>
+                <a:srgbClr val="F52403">
+                  <a:alpha val="50000"/>
+                </a:srgbClr>
+              </a:solidFill>
+              <a:ln>
+                <a:noFill/>
+              </a:ln>
+            </p:spPr>
+            <p:style>
+              <a:lnRef idx="2">
+                <a:schemeClr val="accent1">
+                  <a:shade val="50000"/>
+                </a:schemeClr>
+              </a:lnRef>
+              <a:fillRef idx="1">
+                <a:schemeClr val="accent1"/>
+              </a:fillRef>
+              <a:effectRef idx="0">
+                <a:schemeClr val="accent1"/>
+              </a:effectRef>
+              <a:fontRef idx="minor">
+                <a:schemeClr val="lt1"/>
+              </a:fontRef>
+            </p:style>
+            <p:txBody>
+              <a:bodyPr rtlCol="0" anchor="ctr"/>
+              <a:lstStyle/>
+              <a:p>
+                <a:pPr algn="ctr"/>
+                <a:r>
+                  <a:rPr lang="en-US" altLang="zh-CN" dirty="0"/>
+                  <a:t>TOP</a:t>
+                </a:r>
+                <a:r>
+                  <a:rPr lang="zh-CN" altLang="en-US" dirty="0"/>
+                  <a:t> </a:t>
+                </a:r>
+                <a:r>
+                  <a:rPr lang="en-US" altLang="zh-CN" dirty="0"/>
+                  <a:t>BALLAST</a:t>
+                </a:r>
+                <a:endParaRPr lang="en-US" dirty="0"/>
+              </a:p>
+            </p:txBody>
+          </p:sp>
+          <p:sp>
+            <p:nvSpPr>
+              <p:cNvPr id="46" name="Rectangle 45">
+                <a:extLst>
+                  <a:ext uri="{FF2B5EF4-FFF2-40B4-BE49-F238E27FC236}">
+                    <a16:creationId xmlns:a16="http://schemas.microsoft.com/office/drawing/2014/main" id="{85016916-DEF2-7341-9500-F22C6FEA1D55}"/>
+                  </a:ext>
+                </a:extLst>
+              </p:cNvPr>
+              <p:cNvSpPr/>
+              <p:nvPr/>
+            </p:nvSpPr>
+            <p:spPr>
+              <a:xfrm>
+                <a:off x="1661295" y="1981898"/>
+                <a:ext cx="3614061" cy="301752"/>
+              </a:xfrm>
+              <a:prstGeom prst="rect">
+                <a:avLst/>
+              </a:prstGeom>
+              <a:solidFill>
+                <a:schemeClr val="accent6">
+                  <a:lumMod val="75000"/>
+                  <a:alpha val="50000"/>
+                </a:schemeClr>
+              </a:solidFill>
+              <a:ln>
+                <a:noFill/>
+              </a:ln>
+            </p:spPr>
+            <p:style>
+              <a:lnRef idx="2">
+                <a:schemeClr val="accent1">
+                  <a:shade val="50000"/>
+                </a:schemeClr>
+              </a:lnRef>
+              <a:fillRef idx="1">
+                <a:schemeClr val="accent1"/>
+              </a:fillRef>
+              <a:effectRef idx="0">
+                <a:schemeClr val="accent1"/>
+              </a:effectRef>
+              <a:fontRef idx="minor">
+                <a:schemeClr val="lt1"/>
+              </a:fontRef>
+            </p:style>
+            <p:txBody>
+              <a:bodyPr rtlCol="0" anchor="ctr"/>
+              <a:lstStyle/>
+              <a:p>
+                <a:pPr algn="ctr"/>
+                <a:r>
+                  <a:rPr lang="en-US" altLang="zh-CN" dirty="0"/>
+                  <a:t>BOTTOM</a:t>
+                </a:r>
+                <a:r>
+                  <a:rPr lang="zh-CN" altLang="en-US" dirty="0"/>
+                  <a:t> </a:t>
+                </a:r>
+                <a:r>
+                  <a:rPr lang="en-US" altLang="zh-CN" dirty="0"/>
+                  <a:t>BALLAST</a:t>
+                </a:r>
+                <a:endParaRPr lang="en-US" dirty="0"/>
+              </a:p>
+            </p:txBody>
+          </p:sp>
+          <p:grpSp>
+            <p:nvGrpSpPr>
+              <p:cNvPr id="57" name="Group 56">
+                <a:extLst>
+                  <a:ext uri="{FF2B5EF4-FFF2-40B4-BE49-F238E27FC236}">
+                    <a16:creationId xmlns:a16="http://schemas.microsoft.com/office/drawing/2014/main" id="{3ADBC7F4-E301-6145-852F-A542EFB803E8}"/>
+                  </a:ext>
+                </a:extLst>
+              </p:cNvPr>
+              <p:cNvGrpSpPr/>
+              <p:nvPr/>
+            </p:nvGrpSpPr>
+            <p:grpSpPr>
+              <a:xfrm>
+                <a:off x="5275356" y="1680410"/>
+                <a:ext cx="925176" cy="603240"/>
+                <a:chOff x="5275355" y="1829433"/>
+                <a:chExt cx="925176" cy="603240"/>
+              </a:xfrm>
+            </p:grpSpPr>
+            <p:sp>
+              <p:nvSpPr>
+                <p:cNvPr id="50" name="Rectangle 49">
+                  <a:extLst>
+                    <a:ext uri="{FF2B5EF4-FFF2-40B4-BE49-F238E27FC236}">
+                      <a16:creationId xmlns:a16="http://schemas.microsoft.com/office/drawing/2014/main" id="{664D51BD-F0D7-EF46-9ADA-142A69C98F61}"/>
+                    </a:ext>
+                  </a:extLst>
+                </p:cNvPr>
+                <p:cNvSpPr/>
+                <p:nvPr/>
+              </p:nvSpPr>
+              <p:spPr>
+                <a:xfrm>
+                  <a:off x="5275355" y="1829433"/>
+                  <a:ext cx="87316" cy="603240"/>
+                </a:xfrm>
+                <a:prstGeom prst="rect">
+                  <a:avLst/>
+                </a:prstGeom>
+                <a:solidFill>
+                  <a:schemeClr val="accent4">
+                    <a:lumMod val="60000"/>
+                    <a:lumOff val="40000"/>
+                    <a:alpha val="50000"/>
+                  </a:schemeClr>
+                </a:solidFill>
+                <a:ln>
+                  <a:noFill/>
+                </a:ln>
+              </p:spPr>
+              <p:style>
+                <a:lnRef idx="2">
+                  <a:schemeClr val="accent1">
+                    <a:shade val="50000"/>
+                  </a:schemeClr>
+                </a:lnRef>
+                <a:fillRef idx="1">
+                  <a:schemeClr val="accent1"/>
+                </a:fillRef>
+                <a:effectRef idx="0">
+                  <a:schemeClr val="accent1"/>
+                </a:effectRef>
+                <a:fontRef idx="minor">
+                  <a:schemeClr val="lt1"/>
+                </a:fontRef>
+              </p:style>
+              <p:txBody>
+                <a:bodyPr rtlCol="0" anchor="ctr"/>
+                <a:lstStyle/>
+                <a:p>
+                  <a:pPr algn="ctr"/>
+                  <a:endParaRPr lang="en-US" dirty="0"/>
+                </a:p>
+              </p:txBody>
+            </p:sp>
+            <p:sp>
+              <p:nvSpPr>
+                <p:cNvPr id="51" name="Right Triangle 50">
+                  <a:extLst>
+                    <a:ext uri="{FF2B5EF4-FFF2-40B4-BE49-F238E27FC236}">
+                      <a16:creationId xmlns:a16="http://schemas.microsoft.com/office/drawing/2014/main" id="{3B67553B-99FC-F840-911F-A908ABBD0ED7}"/>
+                    </a:ext>
+                  </a:extLst>
+                </p:cNvPr>
+                <p:cNvSpPr/>
+                <p:nvPr/>
+              </p:nvSpPr>
+              <p:spPr>
+                <a:xfrm>
+                  <a:off x="5362671" y="1829433"/>
+                  <a:ext cx="837860" cy="603240"/>
+                </a:xfrm>
+                <a:prstGeom prst="rtTriangle">
+                  <a:avLst/>
+                </a:prstGeom>
+                <a:solidFill>
+                  <a:schemeClr val="accent4">
+                    <a:lumMod val="60000"/>
+                    <a:lumOff val="40000"/>
+                    <a:alpha val="50000"/>
+                  </a:schemeClr>
+                </a:solidFill>
+                <a:ln>
+                  <a:noFill/>
+                </a:ln>
+              </p:spPr>
+              <p:style>
+                <a:lnRef idx="2">
+                  <a:schemeClr val="accent1">
+                    <a:shade val="50000"/>
+                  </a:schemeClr>
+                </a:lnRef>
+                <a:fillRef idx="1">
+                  <a:schemeClr val="accent1"/>
+                </a:fillRef>
+                <a:effectRef idx="0">
+                  <a:schemeClr val="accent1"/>
+                </a:effectRef>
+                <a:fontRef idx="minor">
+                  <a:schemeClr val="lt1"/>
+                </a:fontRef>
+              </p:style>
+              <p:txBody>
+                <a:bodyPr rtlCol="0" anchor="ctr"/>
+                <a:lstStyle/>
+                <a:p>
+                  <a:pPr algn="ctr"/>
+                  <a:endParaRPr lang="en-US" dirty="0"/>
+                </a:p>
+              </p:txBody>
+            </p:sp>
+          </p:grpSp>
+          <p:grpSp>
+            <p:nvGrpSpPr>
+              <p:cNvPr id="56" name="Group 55">
+                <a:extLst>
+                  <a:ext uri="{FF2B5EF4-FFF2-40B4-BE49-F238E27FC236}">
+                    <a16:creationId xmlns:a16="http://schemas.microsoft.com/office/drawing/2014/main" id="{0E8478F5-5E25-2F44-9F62-551CC9A907A5}"/>
+                  </a:ext>
+                </a:extLst>
+              </p:cNvPr>
+              <p:cNvGrpSpPr/>
+              <p:nvPr/>
+            </p:nvGrpSpPr>
+            <p:grpSpPr>
+              <a:xfrm>
+                <a:off x="674510" y="1680278"/>
+                <a:ext cx="986785" cy="603240"/>
+                <a:chOff x="693964" y="1829301"/>
+                <a:chExt cx="986785" cy="603240"/>
+              </a:xfrm>
+            </p:grpSpPr>
+            <p:sp>
+              <p:nvSpPr>
+                <p:cNvPr id="52" name="Rectangle 51">
+                  <a:extLst>
+                    <a:ext uri="{FF2B5EF4-FFF2-40B4-BE49-F238E27FC236}">
+                      <a16:creationId xmlns:a16="http://schemas.microsoft.com/office/drawing/2014/main" id="{E4A45EBF-6E3F-2E49-9141-253D00A001DD}"/>
+                    </a:ext>
+                  </a:extLst>
+                </p:cNvPr>
+                <p:cNvSpPr/>
+                <p:nvPr/>
+              </p:nvSpPr>
+              <p:spPr>
+                <a:xfrm>
+                  <a:off x="1593433" y="1829301"/>
+                  <a:ext cx="87316" cy="603240"/>
+                </a:xfrm>
+                <a:prstGeom prst="rect">
+                  <a:avLst/>
+                </a:prstGeom>
+                <a:solidFill>
+                  <a:schemeClr val="accent4">
+                    <a:lumMod val="60000"/>
+                    <a:lumOff val="40000"/>
+                    <a:alpha val="50000"/>
+                  </a:schemeClr>
+                </a:solidFill>
+                <a:ln>
+                  <a:noFill/>
+                </a:ln>
+              </p:spPr>
+              <p:style>
+                <a:lnRef idx="2">
+                  <a:schemeClr val="accent1">
+                    <a:shade val="50000"/>
+                  </a:schemeClr>
+                </a:lnRef>
+                <a:fillRef idx="1">
+                  <a:schemeClr val="accent1"/>
+                </a:fillRef>
+                <a:effectRef idx="0">
+                  <a:schemeClr val="accent1"/>
+                </a:effectRef>
+                <a:fontRef idx="minor">
+                  <a:schemeClr val="lt1"/>
+                </a:fontRef>
+              </p:style>
+              <p:txBody>
+                <a:bodyPr rtlCol="0" anchor="ctr"/>
+                <a:lstStyle/>
+                <a:p>
+                  <a:pPr algn="ctr"/>
+                  <a:endParaRPr lang="en-US" dirty="0"/>
+                </a:p>
+              </p:txBody>
+            </p:sp>
+            <p:sp>
+              <p:nvSpPr>
+                <p:cNvPr id="55" name="Right Triangle 54">
+                  <a:extLst>
+                    <a:ext uri="{FF2B5EF4-FFF2-40B4-BE49-F238E27FC236}">
+                      <a16:creationId xmlns:a16="http://schemas.microsoft.com/office/drawing/2014/main" id="{EB4A48DE-2285-DE42-95E2-AC3468986CE8}"/>
+                    </a:ext>
+                  </a:extLst>
+                </p:cNvPr>
+                <p:cNvSpPr/>
+                <p:nvPr/>
+              </p:nvSpPr>
+              <p:spPr>
+                <a:xfrm rot="16200000">
+                  <a:off x="842079" y="1681186"/>
+                  <a:ext cx="603240" cy="899469"/>
+                </a:xfrm>
+                <a:prstGeom prst="rtTriangle">
+                  <a:avLst/>
+                </a:prstGeom>
+                <a:solidFill>
+                  <a:schemeClr val="accent4">
+                    <a:lumMod val="60000"/>
+                    <a:lumOff val="40000"/>
+                    <a:alpha val="50000"/>
+                  </a:schemeClr>
+                </a:solidFill>
+                <a:ln>
+                  <a:noFill/>
+                </a:ln>
+              </p:spPr>
+              <p:style>
+                <a:lnRef idx="2">
+                  <a:schemeClr val="accent1">
+                    <a:shade val="50000"/>
+                  </a:schemeClr>
+                </a:lnRef>
+                <a:fillRef idx="1">
+                  <a:schemeClr val="accent1"/>
+                </a:fillRef>
+                <a:effectRef idx="0">
+                  <a:schemeClr val="accent1"/>
+                </a:effectRef>
+                <a:fontRef idx="minor">
+                  <a:schemeClr val="lt1"/>
+                </a:fontRef>
+              </p:style>
+              <p:txBody>
+                <a:bodyPr rtlCol="0" anchor="ctr"/>
+                <a:lstStyle/>
+                <a:p>
+                  <a:pPr algn="ctr"/>
+                  <a:endParaRPr lang="en-US" dirty="0"/>
+                </a:p>
+              </p:txBody>
+            </p:sp>
+          </p:grpSp>
+          <p:sp>
+            <p:nvSpPr>
+              <p:cNvPr id="58" name="TextBox 57">
+                <a:extLst>
+                  <a:ext uri="{FF2B5EF4-FFF2-40B4-BE49-F238E27FC236}">
+                    <a16:creationId xmlns:a16="http://schemas.microsoft.com/office/drawing/2014/main" id="{3F4AD657-D520-E245-A45C-2ECAC27751B6}"/>
+                  </a:ext>
+                </a:extLst>
+              </p:cNvPr>
+              <p:cNvSpPr txBox="1"/>
+              <p:nvPr/>
+            </p:nvSpPr>
+            <p:spPr>
+              <a:xfrm>
+                <a:off x="908232" y="1956025"/>
+                <a:ext cx="963237" cy="369332"/>
+              </a:xfrm>
+              <a:prstGeom prst="rect">
+                <a:avLst/>
+              </a:prstGeom>
+              <a:noFill/>
+            </p:spPr>
+            <p:txBody>
+              <a:bodyPr wrap="square" rtlCol="0">
+                <a:spAutoFit/>
+              </a:bodyPr>
+              <a:lstStyle/>
+              <a:p>
+                <a:r>
+                  <a:rPr lang="en-US" altLang="zh-CN" dirty="0">
+                    <a:solidFill>
+                      <a:schemeClr val="bg1"/>
+                    </a:solidFill>
+                  </a:rPr>
+                  <a:t>SHLDR.</a:t>
+                </a:r>
+                <a:endParaRPr lang="en-US" dirty="0">
+                  <a:solidFill>
+                    <a:schemeClr val="bg1"/>
+                  </a:solidFill>
+                </a:endParaRPr>
+              </a:p>
+            </p:txBody>
+          </p:sp>
+          <p:sp>
+            <p:nvSpPr>
+              <p:cNvPr id="59" name="TextBox 58">
+                <a:extLst>
+                  <a:ext uri="{FF2B5EF4-FFF2-40B4-BE49-F238E27FC236}">
+                    <a16:creationId xmlns:a16="http://schemas.microsoft.com/office/drawing/2014/main" id="{27810A11-7FB0-494B-B924-DB2AFF73213B}"/>
+                  </a:ext>
+                </a:extLst>
+              </p:cNvPr>
+              <p:cNvSpPr txBox="1"/>
+              <p:nvPr/>
+            </p:nvSpPr>
+            <p:spPr>
+              <a:xfrm>
+                <a:off x="5199291" y="1981897"/>
+                <a:ext cx="963237" cy="369332"/>
+              </a:xfrm>
+              <a:prstGeom prst="rect">
+                <a:avLst/>
+              </a:prstGeom>
+              <a:noFill/>
+            </p:spPr>
+            <p:txBody>
+              <a:bodyPr wrap="square" rtlCol="0">
+                <a:spAutoFit/>
+              </a:bodyPr>
+              <a:lstStyle/>
+              <a:p>
+                <a:r>
+                  <a:rPr lang="en-US" altLang="zh-CN" dirty="0">
+                    <a:solidFill>
+                      <a:schemeClr val="bg1"/>
+                    </a:solidFill>
+                  </a:rPr>
+                  <a:t>SHLDR.</a:t>
+                </a:r>
+                <a:endParaRPr lang="en-US" dirty="0">
+                  <a:solidFill>
+                    <a:schemeClr val="bg1"/>
+                  </a:solidFill>
+                </a:endParaRPr>
+              </a:p>
+            </p:txBody>
+          </p:sp>
+        </p:grpSp>
+      </p:grpSp>
+      <p:sp>
+        <p:nvSpPr>
+          <p:cNvPr id="63" name="Rectangle 62">
+            <a:extLst>
+              <a:ext uri="{FF2B5EF4-FFF2-40B4-BE49-F238E27FC236}">
+                <a16:creationId xmlns:a16="http://schemas.microsoft.com/office/drawing/2014/main" id="{153F2A92-6D32-1340-B665-0BD0D37739EF}"/>
+              </a:ext>
+            </a:extLst>
+          </p:cNvPr>
+          <p:cNvSpPr/>
+          <p:nvPr/>
+        </p:nvSpPr>
+        <p:spPr>
+          <a:xfrm>
+            <a:off x="6477576" y="3232404"/>
+            <a:ext cx="2571241" cy="400110"/>
+          </a:xfrm>
+          <a:prstGeom prst="rect">
+            <a:avLst/>
+          </a:prstGeom>
+        </p:spPr>
+        <p:txBody>
+          <a:bodyPr wrap="square">
+            <a:spAutoFit/>
+          </a:bodyPr>
+          <a:lstStyle/>
+          <a:p>
+            <a:pPr algn="ctr"/>
+            <a:r>
+              <a:rPr lang="en-US" altLang="zh-CN" sz="2000" b="1" u="sng" dirty="0">
+                <a:latin typeface="Times New Roman" panose="02020603050405020304" pitchFamily="18" charset="0"/>
+                <a:cs typeface="Times New Roman" panose="02020603050405020304" pitchFamily="18" charset="0"/>
+              </a:rPr>
+              <a:t>Data-driven</a:t>
+            </a:r>
+            <a:endParaRPr lang="zh-CN" altLang="en-US" sz="1400" u="sng" dirty="0">
+              <a:latin typeface="Times New Roman" panose="02020603050405020304" pitchFamily="18" charset="0"/>
+              <a:cs typeface="Times New Roman" panose="02020603050405020304" pitchFamily="18" charset="0"/>
+            </a:endParaRPr>
+          </a:p>
+        </p:txBody>
+      </p:sp>
+      <p:grpSp>
+        <p:nvGrpSpPr>
+          <p:cNvPr id="5" name="Group 4">
+            <a:extLst>
+              <a:ext uri="{FF2B5EF4-FFF2-40B4-BE49-F238E27FC236}">
+                <a16:creationId xmlns:a16="http://schemas.microsoft.com/office/drawing/2014/main" id="{F735E35D-ADE5-874F-93AD-17D3DAA2C8C4}"/>
+              </a:ext>
+            </a:extLst>
+          </p:cNvPr>
+          <p:cNvGrpSpPr/>
+          <p:nvPr/>
+        </p:nvGrpSpPr>
+        <p:grpSpPr>
+          <a:xfrm>
+            <a:off x="707446" y="3004338"/>
+            <a:ext cx="5493086" cy="912378"/>
+            <a:chOff x="707446" y="3004338"/>
+            <a:chExt cx="5493086" cy="912378"/>
+          </a:xfrm>
+        </p:grpSpPr>
+        <p:pic>
+          <p:nvPicPr>
+            <p:cNvPr id="62" name="Picture 61">
+              <a:extLst>
+                <a:ext uri="{FF2B5EF4-FFF2-40B4-BE49-F238E27FC236}">
+                  <a16:creationId xmlns:a16="http://schemas.microsoft.com/office/drawing/2014/main" id="{5A7C8397-3F4B-F44B-915E-ECF33289239E}"/>
+                </a:ext>
+              </a:extLst>
+            </p:cNvPr>
+            <p:cNvPicPr>
+              <a:picLocks noChangeAspect="1"/>
+            </p:cNvPicPr>
+            <p:nvPr/>
+          </p:nvPicPr>
+          <p:blipFill rotWithShape="1">
+            <a:blip r:embed="rId2"/>
+            <a:srcRect t="48004" r="10529" b="19588"/>
+            <a:stretch/>
+          </p:blipFill>
+          <p:spPr>
+            <a:xfrm>
+              <a:off x="707446" y="3004338"/>
+              <a:ext cx="5488018" cy="912378"/>
+            </a:xfrm>
+            <a:prstGeom prst="rect">
+              <a:avLst/>
+            </a:prstGeom>
+          </p:spPr>
+        </p:pic>
+        <p:grpSp>
+          <p:nvGrpSpPr>
+            <p:cNvPr id="78" name="Group 77">
+              <a:extLst>
+                <a:ext uri="{FF2B5EF4-FFF2-40B4-BE49-F238E27FC236}">
+                  <a16:creationId xmlns:a16="http://schemas.microsoft.com/office/drawing/2014/main" id="{8ACDE562-8A69-9B4F-89C2-95D2252EFAB7}"/>
+                </a:ext>
+              </a:extLst>
+            </p:cNvPr>
+            <p:cNvGrpSpPr/>
+            <p:nvPr/>
+          </p:nvGrpSpPr>
+          <p:grpSpPr>
+            <a:xfrm>
+              <a:off x="754459" y="3224307"/>
+              <a:ext cx="5446073" cy="612059"/>
+              <a:chOff x="707762" y="3265896"/>
+              <a:chExt cx="5446073" cy="612059"/>
+            </a:xfrm>
+          </p:grpSpPr>
+          <p:sp>
+            <p:nvSpPr>
+              <p:cNvPr id="67" name="Trapezoid 66">
+                <a:extLst>
+                  <a:ext uri="{FF2B5EF4-FFF2-40B4-BE49-F238E27FC236}">
+                    <a16:creationId xmlns:a16="http://schemas.microsoft.com/office/drawing/2014/main" id="{E3180C23-0322-D243-978D-8916705CF03F}"/>
+                  </a:ext>
+                </a:extLst>
+              </p:cNvPr>
+              <p:cNvSpPr/>
+              <p:nvPr/>
+            </p:nvSpPr>
+            <p:spPr>
+              <a:xfrm>
+                <a:off x="1504605" y="3265896"/>
+                <a:ext cx="1148194" cy="400110"/>
+              </a:xfrm>
+              <a:prstGeom prst="trapezoid">
+                <a:avLst>
+                  <a:gd name="adj" fmla="val 95638"/>
+                </a:avLst>
+              </a:prstGeom>
+              <a:solidFill>
+                <a:srgbClr val="F52403">
+                  <a:alpha val="50000"/>
+                </a:srgbClr>
+              </a:solidFill>
+              <a:ln>
+                <a:noFill/>
+              </a:ln>
+            </p:spPr>
+            <p:style>
+              <a:lnRef idx="2">
+                <a:schemeClr val="accent1">
+                  <a:shade val="50000"/>
+                </a:schemeClr>
+              </a:lnRef>
+              <a:fillRef idx="1">
+                <a:schemeClr val="accent1"/>
+              </a:fillRef>
+              <a:effectRef idx="0">
+                <a:schemeClr val="accent1"/>
+              </a:effectRef>
+              <a:fontRef idx="minor">
+                <a:schemeClr val="lt1"/>
+              </a:fontRef>
+            </p:style>
+            <p:txBody>
+              <a:bodyPr rtlCol="0" anchor="ctr"/>
+              <a:lstStyle/>
+              <a:p>
+                <a:pPr algn="ctr"/>
+                <a:endParaRPr lang="en-US" dirty="0"/>
+              </a:p>
+            </p:txBody>
+          </p:sp>
+          <p:sp>
+            <p:nvSpPr>
+              <p:cNvPr id="68" name="Trapezoid 67">
+                <a:extLst>
+                  <a:ext uri="{FF2B5EF4-FFF2-40B4-BE49-F238E27FC236}">
+                    <a16:creationId xmlns:a16="http://schemas.microsoft.com/office/drawing/2014/main" id="{174CE406-B614-9743-911B-043ED0369EBC}"/>
+                  </a:ext>
+                </a:extLst>
+              </p:cNvPr>
+              <p:cNvSpPr/>
+              <p:nvPr/>
+            </p:nvSpPr>
+            <p:spPr>
+              <a:xfrm>
+                <a:off x="2652799" y="3265896"/>
+                <a:ext cx="1545128" cy="400110"/>
+              </a:xfrm>
+              <a:prstGeom prst="trapezoid">
+                <a:avLst>
+                  <a:gd name="adj" fmla="val 62397"/>
+                </a:avLst>
+              </a:prstGeom>
+              <a:solidFill>
+                <a:srgbClr val="F52403">
+                  <a:alpha val="50000"/>
+                </a:srgbClr>
+              </a:solidFill>
+              <a:ln>
+                <a:noFill/>
+              </a:ln>
+            </p:spPr>
+            <p:style>
+              <a:lnRef idx="2">
+                <a:schemeClr val="accent1">
+                  <a:shade val="50000"/>
+                </a:schemeClr>
+              </a:lnRef>
+              <a:fillRef idx="1">
+                <a:schemeClr val="accent1"/>
+              </a:fillRef>
+              <a:effectRef idx="0">
+                <a:schemeClr val="accent1"/>
+              </a:effectRef>
+              <a:fontRef idx="minor">
+                <a:schemeClr val="lt1"/>
+              </a:fontRef>
+            </p:style>
+            <p:txBody>
+              <a:bodyPr rtlCol="0" anchor="ctr"/>
+              <a:lstStyle/>
+              <a:p>
+                <a:pPr algn="ctr"/>
+                <a:endParaRPr lang="en-US" dirty="0"/>
+              </a:p>
+            </p:txBody>
+          </p:sp>
+          <p:sp>
+            <p:nvSpPr>
+              <p:cNvPr id="69" name="Trapezoid 68">
+                <a:extLst>
+                  <a:ext uri="{FF2B5EF4-FFF2-40B4-BE49-F238E27FC236}">
+                    <a16:creationId xmlns:a16="http://schemas.microsoft.com/office/drawing/2014/main" id="{11A12899-CA5B-0544-AE20-D21692D7DEFE}"/>
+                  </a:ext>
+                </a:extLst>
+              </p:cNvPr>
+              <p:cNvSpPr/>
+              <p:nvPr/>
+            </p:nvSpPr>
+            <p:spPr>
+              <a:xfrm>
+                <a:off x="4197926" y="3265896"/>
+                <a:ext cx="1164746" cy="400110"/>
+              </a:xfrm>
+              <a:prstGeom prst="trapezoid">
+                <a:avLst>
+                  <a:gd name="adj" fmla="val 89406"/>
+                </a:avLst>
+              </a:prstGeom>
+              <a:solidFill>
+                <a:srgbClr val="F52403">
+                  <a:alpha val="50000"/>
+                </a:srgbClr>
+              </a:solidFill>
+              <a:ln>
+                <a:noFill/>
+              </a:ln>
+            </p:spPr>
+            <p:style>
+              <a:lnRef idx="2">
+                <a:schemeClr val="accent1">
+                  <a:shade val="50000"/>
+                </a:schemeClr>
+              </a:lnRef>
+              <a:fillRef idx="1">
+                <a:schemeClr val="accent1"/>
+              </a:fillRef>
+              <a:effectRef idx="0">
+                <a:schemeClr val="accent1"/>
+              </a:effectRef>
+              <a:fontRef idx="minor">
+                <a:schemeClr val="lt1"/>
+              </a:fontRef>
+            </p:style>
+            <p:txBody>
+              <a:bodyPr rtlCol="0" anchor="ctr"/>
+              <a:lstStyle/>
+              <a:p>
+                <a:pPr algn="ctr"/>
+                <a:endParaRPr lang="en-US" dirty="0"/>
+              </a:p>
+            </p:txBody>
+          </p:sp>
+          <p:sp>
+            <p:nvSpPr>
+              <p:cNvPr id="71" name="Parallelogram 70">
+                <a:extLst>
+                  <a:ext uri="{FF2B5EF4-FFF2-40B4-BE49-F238E27FC236}">
+                    <a16:creationId xmlns:a16="http://schemas.microsoft.com/office/drawing/2014/main" id="{ADA58081-8DC5-7E46-89A0-3E25E7946DBB}"/>
+                  </a:ext>
+                </a:extLst>
+              </p:cNvPr>
+              <p:cNvSpPr/>
+              <p:nvPr/>
+            </p:nvSpPr>
+            <p:spPr>
+              <a:xfrm>
+                <a:off x="707762" y="3265896"/>
+                <a:ext cx="1287295" cy="612059"/>
+              </a:xfrm>
+              <a:prstGeom prst="parallelogram">
+                <a:avLst>
+                  <a:gd name="adj" fmla="val 136369"/>
+                </a:avLst>
               </a:prstGeom>
               <a:solidFill>
                 <a:schemeClr val="accent4">
@@ -5654,10 +6291,10 @@
           </p:sp>
           <p:sp>
             <p:nvSpPr>
-              <p:cNvPr id="51" name="Right Triangle 50">
+              <p:cNvPr id="73" name="Parallelogram 72">
                 <a:extLst>
                   <a:ext uri="{FF2B5EF4-FFF2-40B4-BE49-F238E27FC236}">
-                    <a16:creationId xmlns:a16="http://schemas.microsoft.com/office/drawing/2014/main" id="{3B67553B-99FC-F840-911F-A908ABBD0ED7}"/>
+                    <a16:creationId xmlns:a16="http://schemas.microsoft.com/office/drawing/2014/main" id="{44082193-5A9D-2A46-9D76-FCA92423C566}"/>
                   </a:ext>
                 </a:extLst>
               </p:cNvPr>
@@ -5665,89 +6302,14 @@
               <p:nvPr/>
             </p:nvSpPr>
             <p:spPr>
-              <a:xfrm>
-                <a:off x="5362671" y="1829433"/>
-                <a:ext cx="837860" cy="603240"/>
+              <a:xfrm rot="2168141">
+                <a:off x="4793148" y="3420951"/>
+                <a:ext cx="1360687" cy="272111"/>
               </a:xfrm>
-              <a:prstGeom prst="rtTriangle">
-                <a:avLst/>
-              </a:prstGeom>
-              <a:solidFill>
-                <a:schemeClr val="accent4">
-                  <a:lumMod val="60000"/>
-                  <a:lumOff val="40000"/>
-                  <a:alpha val="50000"/>
-                </a:schemeClr>
-              </a:solidFill>
-              <a:ln>
-                <a:noFill/>
-              </a:ln>
-            </p:spPr>
-            <p:style>
-              <a:lnRef idx="2">
-                <a:schemeClr val="accent1">
-                  <a:shade val="50000"/>
-                </a:schemeClr>
-              </a:lnRef>
-              <a:fillRef idx="1">
-                <a:schemeClr val="accent1"/>
-              </a:fillRef>
-              <a:effectRef idx="0">
-                <a:schemeClr val="accent1"/>
-              </a:effectRef>
-              <a:fontRef idx="minor">
-                <a:schemeClr val="lt1"/>
-              </a:fontRef>
-            </p:style>
-            <p:txBody>
-              <a:bodyPr rtlCol="0" anchor="ctr"/>
-              <a:lstStyle/>
-              <a:p>
-                <a:pPr algn="ctr"/>
-                <a:endParaRPr lang="en-US" dirty="0"/>
-              </a:p>
-            </p:txBody>
-          </p:sp>
-        </p:grpSp>
-        <p:grpSp>
-          <p:nvGrpSpPr>
-            <p:cNvPr id="56" name="Group 55">
-              <a:extLst>
-                <a:ext uri="{FF2B5EF4-FFF2-40B4-BE49-F238E27FC236}">
-                  <a16:creationId xmlns:a16="http://schemas.microsoft.com/office/drawing/2014/main" id="{0E8478F5-5E25-2F44-9F62-551CC9A907A5}"/>
-                </a:ext>
-              </a:extLst>
-            </p:cNvPr>
-            <p:cNvGrpSpPr/>
-            <p:nvPr/>
-          </p:nvGrpSpPr>
-          <p:grpSpPr>
-            <a:xfrm>
-              <a:off x="674510" y="1680278"/>
-              <a:ext cx="986785" cy="603240"/>
-              <a:chOff x="693964" y="1829301"/>
-              <a:chExt cx="986785" cy="603240"/>
-            </a:xfrm>
-          </p:grpSpPr>
-          <p:sp>
-            <p:nvSpPr>
-              <p:cNvPr id="52" name="Rectangle 51">
-                <a:extLst>
-                  <a:ext uri="{FF2B5EF4-FFF2-40B4-BE49-F238E27FC236}">
-                    <a16:creationId xmlns:a16="http://schemas.microsoft.com/office/drawing/2014/main" id="{E4A45EBF-6E3F-2E49-9141-253D00A001DD}"/>
-                  </a:ext>
-                </a:extLst>
-              </p:cNvPr>
-              <p:cNvSpPr/>
-              <p:nvPr/>
-            </p:nvSpPr>
-            <p:spPr>
-              <a:xfrm>
-                <a:off x="1593433" y="1829301"/>
-                <a:ext cx="87316" cy="603240"/>
-              </a:xfrm>
-              <a:prstGeom prst="rect">
-                <a:avLst/>
+              <a:prstGeom prst="parallelogram">
+                <a:avLst>
+                  <a:gd name="adj" fmla="val 134109"/>
+                </a:avLst>
               </a:prstGeom>
               <a:solidFill>
                 <a:schemeClr val="accent4">
@@ -5787,10 +6349,10 @@
           </p:sp>
           <p:sp>
             <p:nvSpPr>
-              <p:cNvPr id="55" name="Right Triangle 54">
+              <p:cNvPr id="74" name="Trapezoid 73">
                 <a:extLst>
                   <a:ext uri="{FF2B5EF4-FFF2-40B4-BE49-F238E27FC236}">
-                    <a16:creationId xmlns:a16="http://schemas.microsoft.com/office/drawing/2014/main" id="{EB4A48DE-2285-DE42-95E2-AC3468986CE8}"/>
+                    <a16:creationId xmlns:a16="http://schemas.microsoft.com/office/drawing/2014/main" id="{2768CF91-B0AE-934E-9474-46512646731B}"/>
                   </a:ext>
                 </a:extLst>
               </p:cNvPr>
@@ -5798,12 +6360,129 @@
               <p:nvPr/>
             </p:nvSpPr>
             <p:spPr>
-              <a:xfrm rot="16200000">
-                <a:off x="842079" y="1681186"/>
-                <a:ext cx="603240" cy="899469"/>
+              <a:xfrm>
+                <a:off x="1222493" y="3666006"/>
+                <a:ext cx="4386738" cy="195758"/>
               </a:xfrm>
-              <a:prstGeom prst="rtTriangle">
-                <a:avLst/>
+              <a:prstGeom prst="trapezoid">
+                <a:avLst>
+                  <a:gd name="adj" fmla="val 128628"/>
+                </a:avLst>
+              </a:prstGeom>
+              <a:solidFill>
+                <a:schemeClr val="accent6">
+                  <a:lumMod val="75000"/>
+                  <a:alpha val="50000"/>
+                </a:schemeClr>
+              </a:solidFill>
+              <a:ln>
+                <a:noFill/>
+              </a:ln>
+            </p:spPr>
+            <p:style>
+              <a:lnRef idx="2">
+                <a:schemeClr val="accent1">
+                  <a:shade val="50000"/>
+                </a:schemeClr>
+              </a:lnRef>
+              <a:fillRef idx="1">
+                <a:schemeClr val="accent1"/>
+              </a:fillRef>
+              <a:effectRef idx="0">
+                <a:schemeClr val="accent1"/>
+              </a:effectRef>
+              <a:fontRef idx="minor">
+                <a:schemeClr val="lt1"/>
+              </a:fontRef>
+            </p:style>
+            <p:txBody>
+              <a:bodyPr rtlCol="0" anchor="ctr"/>
+              <a:lstStyle/>
+              <a:p>
+                <a:pPr algn="ctr"/>
+                <a:endParaRPr lang="en-US" dirty="0"/>
+              </a:p>
+            </p:txBody>
+          </p:sp>
+          <p:sp>
+            <p:nvSpPr>
+              <p:cNvPr id="75" name="Triangle 74">
+                <a:extLst>
+                  <a:ext uri="{FF2B5EF4-FFF2-40B4-BE49-F238E27FC236}">
+                    <a16:creationId xmlns:a16="http://schemas.microsoft.com/office/drawing/2014/main" id="{4458E4F4-6785-8B4E-822F-4DB8B07A3A34}"/>
+                  </a:ext>
+                </a:extLst>
+              </p:cNvPr>
+              <p:cNvSpPr/>
+              <p:nvPr/>
+            </p:nvSpPr>
+            <p:spPr>
+              <a:xfrm rot="10800000">
+                <a:off x="2267386" y="3265896"/>
+                <a:ext cx="667524" cy="400110"/>
+              </a:xfrm>
+              <a:prstGeom prst="triangle">
+                <a:avLst>
+                  <a:gd name="adj" fmla="val 42105"/>
+                </a:avLst>
+              </a:prstGeom>
+              <a:solidFill>
+                <a:schemeClr val="accent4">
+                  <a:lumMod val="60000"/>
+                  <a:lumOff val="40000"/>
+                  <a:alpha val="50000"/>
+                </a:schemeClr>
+              </a:solidFill>
+              <a:ln>
+                <a:noFill/>
+              </a:ln>
+            </p:spPr>
+            <p:style>
+              <a:lnRef idx="2">
+                <a:schemeClr val="accent1">
+                  <a:shade val="50000"/>
+                </a:schemeClr>
+              </a:lnRef>
+              <a:fillRef idx="1">
+                <a:schemeClr val="accent1"/>
+              </a:fillRef>
+              <a:effectRef idx="0">
+                <a:schemeClr val="accent1"/>
+              </a:effectRef>
+              <a:fontRef idx="minor">
+                <a:schemeClr val="lt1"/>
+              </a:fontRef>
+            </p:style>
+            <p:txBody>
+              <a:bodyPr rtlCol="0" anchor="ctr"/>
+              <a:lstStyle/>
+              <a:p>
+                <a:pPr algn="ctr"/>
+                <a:endParaRPr lang="en-US" dirty="0"/>
+              </a:p>
+            </p:txBody>
+          </p:sp>
+          <p:sp>
+            <p:nvSpPr>
+              <p:cNvPr id="76" name="Triangle 75">
+                <a:extLst>
+                  <a:ext uri="{FF2B5EF4-FFF2-40B4-BE49-F238E27FC236}">
+                    <a16:creationId xmlns:a16="http://schemas.microsoft.com/office/drawing/2014/main" id="{F60A1F32-E25C-A949-83B1-8287A8825252}"/>
+                  </a:ext>
+                </a:extLst>
+              </p:cNvPr>
+              <p:cNvSpPr/>
+              <p:nvPr/>
+            </p:nvSpPr>
+            <p:spPr>
+              <a:xfrm rot="10800000">
+                <a:off x="3915817" y="3273992"/>
+                <a:ext cx="667524" cy="400110"/>
+              </a:xfrm>
+              <a:prstGeom prst="triangle">
+                <a:avLst>
+                  <a:gd name="adj" fmla="val 57468"/>
+                </a:avLst>
               </a:prstGeom>
               <a:solidFill>
                 <a:schemeClr val="accent4">
@@ -5842,643 +6521,6 @@
             </p:txBody>
           </p:sp>
         </p:grpSp>
-        <p:sp>
-          <p:nvSpPr>
-            <p:cNvPr id="58" name="TextBox 57">
-              <a:extLst>
-                <a:ext uri="{FF2B5EF4-FFF2-40B4-BE49-F238E27FC236}">
-                  <a16:creationId xmlns:a16="http://schemas.microsoft.com/office/drawing/2014/main" id="{3F4AD657-D520-E245-A45C-2ECAC27751B6}"/>
-                </a:ext>
-              </a:extLst>
-            </p:cNvPr>
-            <p:cNvSpPr txBox="1"/>
-            <p:nvPr/>
-          </p:nvSpPr>
-          <p:spPr>
-            <a:xfrm>
-              <a:off x="908232" y="1956025"/>
-              <a:ext cx="963237" cy="369332"/>
-            </a:xfrm>
-            <a:prstGeom prst="rect">
-              <a:avLst/>
-            </a:prstGeom>
-            <a:noFill/>
-          </p:spPr>
-          <p:txBody>
-            <a:bodyPr wrap="square" rtlCol="0">
-              <a:spAutoFit/>
-            </a:bodyPr>
-            <a:lstStyle/>
-            <a:p>
-              <a:r>
-                <a:rPr lang="en-US" altLang="zh-CN" dirty="0">
-                  <a:solidFill>
-                    <a:schemeClr val="bg1"/>
-                  </a:solidFill>
-                </a:rPr>
-                <a:t>SHLDR.</a:t>
-              </a:r>
-              <a:endParaRPr lang="en-US" dirty="0">
-                <a:solidFill>
-                  <a:schemeClr val="bg1"/>
-                </a:solidFill>
-              </a:endParaRPr>
-            </a:p>
-          </p:txBody>
-        </p:sp>
-        <p:sp>
-          <p:nvSpPr>
-            <p:cNvPr id="59" name="TextBox 58">
-              <a:extLst>
-                <a:ext uri="{FF2B5EF4-FFF2-40B4-BE49-F238E27FC236}">
-                  <a16:creationId xmlns:a16="http://schemas.microsoft.com/office/drawing/2014/main" id="{27810A11-7FB0-494B-B924-DB2AFF73213B}"/>
-                </a:ext>
-              </a:extLst>
-            </p:cNvPr>
-            <p:cNvSpPr txBox="1"/>
-            <p:nvPr/>
-          </p:nvSpPr>
-          <p:spPr>
-            <a:xfrm>
-              <a:off x="5199291" y="1981897"/>
-              <a:ext cx="963237" cy="369332"/>
-            </a:xfrm>
-            <a:prstGeom prst="rect">
-              <a:avLst/>
-            </a:prstGeom>
-            <a:noFill/>
-          </p:spPr>
-          <p:txBody>
-            <a:bodyPr wrap="square" rtlCol="0">
-              <a:spAutoFit/>
-            </a:bodyPr>
-            <a:lstStyle/>
-            <a:p>
-              <a:r>
-                <a:rPr lang="en-US" altLang="zh-CN" dirty="0">
-                  <a:solidFill>
-                    <a:schemeClr val="bg1"/>
-                  </a:solidFill>
-                </a:rPr>
-                <a:t>SHLDR.</a:t>
-              </a:r>
-              <a:endParaRPr lang="en-US" dirty="0">
-                <a:solidFill>
-                  <a:schemeClr val="bg1"/>
-                </a:solidFill>
-              </a:endParaRPr>
-            </a:p>
-          </p:txBody>
-        </p:sp>
-      </p:grpSp>
-      <p:pic>
-        <p:nvPicPr>
-          <p:cNvPr id="62" name="Picture 61">
-            <a:extLst>
-              <a:ext uri="{FF2B5EF4-FFF2-40B4-BE49-F238E27FC236}">
-                <a16:creationId xmlns:a16="http://schemas.microsoft.com/office/drawing/2014/main" id="{5A7C8397-3F4B-F44B-915E-ECF33289239E}"/>
-              </a:ext>
-            </a:extLst>
-          </p:cNvPr>
-          <p:cNvPicPr>
-            <a:picLocks noChangeAspect="1"/>
-          </p:cNvPicPr>
-          <p:nvPr/>
-        </p:nvPicPr>
-        <p:blipFill rotWithShape="1">
-          <a:blip r:embed="rId2"/>
-          <a:srcRect t="48004" r="10529" b="19588"/>
-          <a:stretch/>
-        </p:blipFill>
-        <p:spPr>
-          <a:xfrm>
-            <a:off x="707446" y="3004338"/>
-            <a:ext cx="5488018" cy="912378"/>
-          </a:xfrm>
-          <a:prstGeom prst="rect">
-            <a:avLst/>
-          </a:prstGeom>
-        </p:spPr>
-      </p:pic>
-      <p:sp>
-        <p:nvSpPr>
-          <p:cNvPr id="63" name="Rectangle 62">
-            <a:extLst>
-              <a:ext uri="{FF2B5EF4-FFF2-40B4-BE49-F238E27FC236}">
-                <a16:creationId xmlns:a16="http://schemas.microsoft.com/office/drawing/2014/main" id="{153F2A92-6D32-1340-B665-0BD0D37739EF}"/>
-              </a:ext>
-            </a:extLst>
-          </p:cNvPr>
-          <p:cNvSpPr/>
-          <p:nvPr/>
-        </p:nvSpPr>
-        <p:spPr>
-          <a:xfrm>
-            <a:off x="6477576" y="3232404"/>
-            <a:ext cx="2571241" cy="400110"/>
-          </a:xfrm>
-          <a:prstGeom prst="rect">
-            <a:avLst/>
-          </a:prstGeom>
-        </p:spPr>
-        <p:txBody>
-          <a:bodyPr wrap="square">
-            <a:spAutoFit/>
-          </a:bodyPr>
-          <a:lstStyle/>
-          <a:p>
-            <a:pPr algn="ctr"/>
-            <a:r>
-              <a:rPr lang="en-US" altLang="zh-CN" sz="2000" b="1" u="sng" dirty="0">
-                <a:latin typeface="Times New Roman" panose="02020603050405020304" pitchFamily="18" charset="0"/>
-                <a:cs typeface="Times New Roman" panose="02020603050405020304" pitchFamily="18" charset="0"/>
-              </a:rPr>
-              <a:t>Data-driven</a:t>
-            </a:r>
-            <a:endParaRPr lang="zh-CN" altLang="en-US" sz="1400" u="sng" dirty="0">
-              <a:latin typeface="Times New Roman" panose="02020603050405020304" pitchFamily="18" charset="0"/>
-              <a:cs typeface="Times New Roman" panose="02020603050405020304" pitchFamily="18" charset="0"/>
-            </a:endParaRPr>
-          </a:p>
-        </p:txBody>
-      </p:sp>
-      <p:grpSp>
-        <p:nvGrpSpPr>
-          <p:cNvPr id="78" name="Group 77">
-            <a:extLst>
-              <a:ext uri="{FF2B5EF4-FFF2-40B4-BE49-F238E27FC236}">
-                <a16:creationId xmlns:a16="http://schemas.microsoft.com/office/drawing/2014/main" id="{8ACDE562-8A69-9B4F-89C2-95D2252EFAB7}"/>
-              </a:ext>
-            </a:extLst>
-          </p:cNvPr>
-          <p:cNvGrpSpPr/>
-          <p:nvPr/>
-        </p:nvGrpSpPr>
-        <p:grpSpPr>
-          <a:xfrm>
-            <a:off x="754459" y="3224307"/>
-            <a:ext cx="5446073" cy="612059"/>
-            <a:chOff x="707762" y="3265896"/>
-            <a:chExt cx="5446073" cy="612059"/>
-          </a:xfrm>
-        </p:grpSpPr>
-        <p:sp>
-          <p:nvSpPr>
-            <p:cNvPr id="67" name="Trapezoid 66">
-              <a:extLst>
-                <a:ext uri="{FF2B5EF4-FFF2-40B4-BE49-F238E27FC236}">
-                  <a16:creationId xmlns:a16="http://schemas.microsoft.com/office/drawing/2014/main" id="{E3180C23-0322-D243-978D-8916705CF03F}"/>
-                </a:ext>
-              </a:extLst>
-            </p:cNvPr>
-            <p:cNvSpPr/>
-            <p:nvPr/>
-          </p:nvSpPr>
-          <p:spPr>
-            <a:xfrm>
-              <a:off x="1504605" y="3265896"/>
-              <a:ext cx="1148194" cy="400110"/>
-            </a:xfrm>
-            <a:prstGeom prst="trapezoid">
-              <a:avLst>
-                <a:gd name="adj" fmla="val 95638"/>
-              </a:avLst>
-            </a:prstGeom>
-            <a:solidFill>
-              <a:srgbClr val="F52403">
-                <a:alpha val="50000"/>
-              </a:srgbClr>
-            </a:solidFill>
-            <a:ln>
-              <a:noFill/>
-            </a:ln>
-          </p:spPr>
-          <p:style>
-            <a:lnRef idx="2">
-              <a:schemeClr val="accent1">
-                <a:shade val="50000"/>
-              </a:schemeClr>
-            </a:lnRef>
-            <a:fillRef idx="1">
-              <a:schemeClr val="accent1"/>
-            </a:fillRef>
-            <a:effectRef idx="0">
-              <a:schemeClr val="accent1"/>
-            </a:effectRef>
-            <a:fontRef idx="minor">
-              <a:schemeClr val="lt1"/>
-            </a:fontRef>
-          </p:style>
-          <p:txBody>
-            <a:bodyPr rtlCol="0" anchor="ctr"/>
-            <a:lstStyle/>
-            <a:p>
-              <a:pPr algn="ctr"/>
-              <a:endParaRPr lang="en-US" dirty="0"/>
-            </a:p>
-          </p:txBody>
-        </p:sp>
-        <p:sp>
-          <p:nvSpPr>
-            <p:cNvPr id="68" name="Trapezoid 67">
-              <a:extLst>
-                <a:ext uri="{FF2B5EF4-FFF2-40B4-BE49-F238E27FC236}">
-                  <a16:creationId xmlns:a16="http://schemas.microsoft.com/office/drawing/2014/main" id="{174CE406-B614-9743-911B-043ED0369EBC}"/>
-                </a:ext>
-              </a:extLst>
-            </p:cNvPr>
-            <p:cNvSpPr/>
-            <p:nvPr/>
-          </p:nvSpPr>
-          <p:spPr>
-            <a:xfrm>
-              <a:off x="2652799" y="3265896"/>
-              <a:ext cx="1545128" cy="400110"/>
-            </a:xfrm>
-            <a:prstGeom prst="trapezoid">
-              <a:avLst>
-                <a:gd name="adj" fmla="val 62397"/>
-              </a:avLst>
-            </a:prstGeom>
-            <a:solidFill>
-              <a:srgbClr val="F52403">
-                <a:alpha val="50000"/>
-              </a:srgbClr>
-            </a:solidFill>
-            <a:ln>
-              <a:noFill/>
-            </a:ln>
-          </p:spPr>
-          <p:style>
-            <a:lnRef idx="2">
-              <a:schemeClr val="accent1">
-                <a:shade val="50000"/>
-              </a:schemeClr>
-            </a:lnRef>
-            <a:fillRef idx="1">
-              <a:schemeClr val="accent1"/>
-            </a:fillRef>
-            <a:effectRef idx="0">
-              <a:schemeClr val="accent1"/>
-            </a:effectRef>
-            <a:fontRef idx="minor">
-              <a:schemeClr val="lt1"/>
-            </a:fontRef>
-          </p:style>
-          <p:txBody>
-            <a:bodyPr rtlCol="0" anchor="ctr"/>
-            <a:lstStyle/>
-            <a:p>
-              <a:pPr algn="ctr"/>
-              <a:endParaRPr lang="en-US" dirty="0"/>
-            </a:p>
-          </p:txBody>
-        </p:sp>
-        <p:sp>
-          <p:nvSpPr>
-            <p:cNvPr id="69" name="Trapezoid 68">
-              <a:extLst>
-                <a:ext uri="{FF2B5EF4-FFF2-40B4-BE49-F238E27FC236}">
-                  <a16:creationId xmlns:a16="http://schemas.microsoft.com/office/drawing/2014/main" id="{11A12899-CA5B-0544-AE20-D21692D7DEFE}"/>
-                </a:ext>
-              </a:extLst>
-            </p:cNvPr>
-            <p:cNvSpPr/>
-            <p:nvPr/>
-          </p:nvSpPr>
-          <p:spPr>
-            <a:xfrm>
-              <a:off x="4197926" y="3265896"/>
-              <a:ext cx="1164746" cy="400110"/>
-            </a:xfrm>
-            <a:prstGeom prst="trapezoid">
-              <a:avLst>
-                <a:gd name="adj" fmla="val 89406"/>
-              </a:avLst>
-            </a:prstGeom>
-            <a:solidFill>
-              <a:srgbClr val="F52403">
-                <a:alpha val="50000"/>
-              </a:srgbClr>
-            </a:solidFill>
-            <a:ln>
-              <a:noFill/>
-            </a:ln>
-          </p:spPr>
-          <p:style>
-            <a:lnRef idx="2">
-              <a:schemeClr val="accent1">
-                <a:shade val="50000"/>
-              </a:schemeClr>
-            </a:lnRef>
-            <a:fillRef idx="1">
-              <a:schemeClr val="accent1"/>
-            </a:fillRef>
-            <a:effectRef idx="0">
-              <a:schemeClr val="accent1"/>
-            </a:effectRef>
-            <a:fontRef idx="minor">
-              <a:schemeClr val="lt1"/>
-            </a:fontRef>
-          </p:style>
-          <p:txBody>
-            <a:bodyPr rtlCol="0" anchor="ctr"/>
-            <a:lstStyle/>
-            <a:p>
-              <a:pPr algn="ctr"/>
-              <a:endParaRPr lang="en-US" dirty="0"/>
-            </a:p>
-          </p:txBody>
-        </p:sp>
-        <p:sp>
-          <p:nvSpPr>
-            <p:cNvPr id="71" name="Parallelogram 70">
-              <a:extLst>
-                <a:ext uri="{FF2B5EF4-FFF2-40B4-BE49-F238E27FC236}">
-                  <a16:creationId xmlns:a16="http://schemas.microsoft.com/office/drawing/2014/main" id="{ADA58081-8DC5-7E46-89A0-3E25E7946DBB}"/>
-                </a:ext>
-              </a:extLst>
-            </p:cNvPr>
-            <p:cNvSpPr/>
-            <p:nvPr/>
-          </p:nvSpPr>
-          <p:spPr>
-            <a:xfrm>
-              <a:off x="707762" y="3265896"/>
-              <a:ext cx="1287295" cy="612059"/>
-            </a:xfrm>
-            <a:prstGeom prst="parallelogram">
-              <a:avLst>
-                <a:gd name="adj" fmla="val 136369"/>
-              </a:avLst>
-            </a:prstGeom>
-            <a:solidFill>
-              <a:schemeClr val="accent4">
-                <a:lumMod val="60000"/>
-                <a:lumOff val="40000"/>
-                <a:alpha val="50000"/>
-              </a:schemeClr>
-            </a:solidFill>
-            <a:ln>
-              <a:noFill/>
-            </a:ln>
-          </p:spPr>
-          <p:style>
-            <a:lnRef idx="2">
-              <a:schemeClr val="accent1">
-                <a:shade val="50000"/>
-              </a:schemeClr>
-            </a:lnRef>
-            <a:fillRef idx="1">
-              <a:schemeClr val="accent1"/>
-            </a:fillRef>
-            <a:effectRef idx="0">
-              <a:schemeClr val="accent1"/>
-            </a:effectRef>
-            <a:fontRef idx="minor">
-              <a:schemeClr val="lt1"/>
-            </a:fontRef>
-          </p:style>
-          <p:txBody>
-            <a:bodyPr rtlCol="0" anchor="ctr"/>
-            <a:lstStyle/>
-            <a:p>
-              <a:pPr algn="ctr"/>
-              <a:endParaRPr lang="en-US" dirty="0"/>
-            </a:p>
-          </p:txBody>
-        </p:sp>
-        <p:sp>
-          <p:nvSpPr>
-            <p:cNvPr id="73" name="Parallelogram 72">
-              <a:extLst>
-                <a:ext uri="{FF2B5EF4-FFF2-40B4-BE49-F238E27FC236}">
-                  <a16:creationId xmlns:a16="http://schemas.microsoft.com/office/drawing/2014/main" id="{44082193-5A9D-2A46-9D76-FCA92423C566}"/>
-                </a:ext>
-              </a:extLst>
-            </p:cNvPr>
-            <p:cNvSpPr/>
-            <p:nvPr/>
-          </p:nvSpPr>
-          <p:spPr>
-            <a:xfrm rot="2168141">
-              <a:off x="4793148" y="3420951"/>
-              <a:ext cx="1360687" cy="272111"/>
-            </a:xfrm>
-            <a:prstGeom prst="parallelogram">
-              <a:avLst>
-                <a:gd name="adj" fmla="val 134109"/>
-              </a:avLst>
-            </a:prstGeom>
-            <a:solidFill>
-              <a:schemeClr val="accent4">
-                <a:lumMod val="60000"/>
-                <a:lumOff val="40000"/>
-                <a:alpha val="50000"/>
-              </a:schemeClr>
-            </a:solidFill>
-            <a:ln>
-              <a:noFill/>
-            </a:ln>
-          </p:spPr>
-          <p:style>
-            <a:lnRef idx="2">
-              <a:schemeClr val="accent1">
-                <a:shade val="50000"/>
-              </a:schemeClr>
-            </a:lnRef>
-            <a:fillRef idx="1">
-              <a:schemeClr val="accent1"/>
-            </a:fillRef>
-            <a:effectRef idx="0">
-              <a:schemeClr val="accent1"/>
-            </a:effectRef>
-            <a:fontRef idx="minor">
-              <a:schemeClr val="lt1"/>
-            </a:fontRef>
-          </p:style>
-          <p:txBody>
-            <a:bodyPr rtlCol="0" anchor="ctr"/>
-            <a:lstStyle/>
-            <a:p>
-              <a:pPr algn="ctr"/>
-              <a:endParaRPr lang="en-US" dirty="0"/>
-            </a:p>
-          </p:txBody>
-        </p:sp>
-        <p:sp>
-          <p:nvSpPr>
-            <p:cNvPr id="74" name="Trapezoid 73">
-              <a:extLst>
-                <a:ext uri="{FF2B5EF4-FFF2-40B4-BE49-F238E27FC236}">
-                  <a16:creationId xmlns:a16="http://schemas.microsoft.com/office/drawing/2014/main" id="{2768CF91-B0AE-934E-9474-46512646731B}"/>
-                </a:ext>
-              </a:extLst>
-            </p:cNvPr>
-            <p:cNvSpPr/>
-            <p:nvPr/>
-          </p:nvSpPr>
-          <p:spPr>
-            <a:xfrm>
-              <a:off x="1222493" y="3666006"/>
-              <a:ext cx="4386738" cy="195758"/>
-            </a:xfrm>
-            <a:prstGeom prst="trapezoid">
-              <a:avLst>
-                <a:gd name="adj" fmla="val 128628"/>
-              </a:avLst>
-            </a:prstGeom>
-            <a:solidFill>
-              <a:schemeClr val="accent6">
-                <a:lumMod val="75000"/>
-                <a:alpha val="50000"/>
-              </a:schemeClr>
-            </a:solidFill>
-            <a:ln>
-              <a:noFill/>
-            </a:ln>
-          </p:spPr>
-          <p:style>
-            <a:lnRef idx="2">
-              <a:schemeClr val="accent1">
-                <a:shade val="50000"/>
-              </a:schemeClr>
-            </a:lnRef>
-            <a:fillRef idx="1">
-              <a:schemeClr val="accent1"/>
-            </a:fillRef>
-            <a:effectRef idx="0">
-              <a:schemeClr val="accent1"/>
-            </a:effectRef>
-            <a:fontRef idx="minor">
-              <a:schemeClr val="lt1"/>
-            </a:fontRef>
-          </p:style>
-          <p:txBody>
-            <a:bodyPr rtlCol="0" anchor="ctr"/>
-            <a:lstStyle/>
-            <a:p>
-              <a:pPr algn="ctr"/>
-              <a:endParaRPr lang="en-US" dirty="0"/>
-            </a:p>
-          </p:txBody>
-        </p:sp>
-        <p:sp>
-          <p:nvSpPr>
-            <p:cNvPr id="75" name="Triangle 74">
-              <a:extLst>
-                <a:ext uri="{FF2B5EF4-FFF2-40B4-BE49-F238E27FC236}">
-                  <a16:creationId xmlns:a16="http://schemas.microsoft.com/office/drawing/2014/main" id="{4458E4F4-6785-8B4E-822F-4DB8B07A3A34}"/>
-                </a:ext>
-              </a:extLst>
-            </p:cNvPr>
-            <p:cNvSpPr/>
-            <p:nvPr/>
-          </p:nvSpPr>
-          <p:spPr>
-            <a:xfrm rot="10800000">
-              <a:off x="2267386" y="3265896"/>
-              <a:ext cx="667524" cy="400110"/>
-            </a:xfrm>
-            <a:prstGeom prst="triangle">
-              <a:avLst>
-                <a:gd name="adj" fmla="val 42105"/>
-              </a:avLst>
-            </a:prstGeom>
-            <a:solidFill>
-              <a:schemeClr val="accent4">
-                <a:lumMod val="60000"/>
-                <a:lumOff val="40000"/>
-                <a:alpha val="50000"/>
-              </a:schemeClr>
-            </a:solidFill>
-            <a:ln>
-              <a:noFill/>
-            </a:ln>
-          </p:spPr>
-          <p:style>
-            <a:lnRef idx="2">
-              <a:schemeClr val="accent1">
-                <a:shade val="50000"/>
-              </a:schemeClr>
-            </a:lnRef>
-            <a:fillRef idx="1">
-              <a:schemeClr val="accent1"/>
-            </a:fillRef>
-            <a:effectRef idx="0">
-              <a:schemeClr val="accent1"/>
-            </a:effectRef>
-            <a:fontRef idx="minor">
-              <a:schemeClr val="lt1"/>
-            </a:fontRef>
-          </p:style>
-          <p:txBody>
-            <a:bodyPr rtlCol="0" anchor="ctr"/>
-            <a:lstStyle/>
-            <a:p>
-              <a:pPr algn="ctr"/>
-              <a:endParaRPr lang="en-US" dirty="0"/>
-            </a:p>
-          </p:txBody>
-        </p:sp>
-        <p:sp>
-          <p:nvSpPr>
-            <p:cNvPr id="76" name="Triangle 75">
-              <a:extLst>
-                <a:ext uri="{FF2B5EF4-FFF2-40B4-BE49-F238E27FC236}">
-                  <a16:creationId xmlns:a16="http://schemas.microsoft.com/office/drawing/2014/main" id="{F60A1F32-E25C-A949-83B1-8287A8825252}"/>
-                </a:ext>
-              </a:extLst>
-            </p:cNvPr>
-            <p:cNvSpPr/>
-            <p:nvPr/>
-          </p:nvSpPr>
-          <p:spPr>
-            <a:xfrm rot="10800000">
-              <a:off x="3915817" y="3273992"/>
-              <a:ext cx="667524" cy="400110"/>
-            </a:xfrm>
-            <a:prstGeom prst="triangle">
-              <a:avLst>
-                <a:gd name="adj" fmla="val 57468"/>
-              </a:avLst>
-            </a:prstGeom>
-            <a:solidFill>
-              <a:schemeClr val="accent4">
-                <a:lumMod val="60000"/>
-                <a:lumOff val="40000"/>
-                <a:alpha val="50000"/>
-              </a:schemeClr>
-            </a:solidFill>
-            <a:ln>
-              <a:noFill/>
-            </a:ln>
-          </p:spPr>
-          <p:style>
-            <a:lnRef idx="2">
-              <a:schemeClr val="accent1">
-                <a:shade val="50000"/>
-              </a:schemeClr>
-            </a:lnRef>
-            <a:fillRef idx="1">
-              <a:schemeClr val="accent1"/>
-            </a:fillRef>
-            <a:effectRef idx="0">
-              <a:schemeClr val="accent1"/>
-            </a:effectRef>
-            <a:fontRef idx="minor">
-              <a:schemeClr val="lt1"/>
-            </a:fontRef>
-          </p:style>
-          <p:txBody>
-            <a:bodyPr rtlCol="0" anchor="ctr"/>
-            <a:lstStyle/>
-            <a:p>
-              <a:pPr algn="ctr"/>
-              <a:endParaRPr lang="en-US" dirty="0"/>
-            </a:p>
-          </p:txBody>
-        </p:sp>
       </p:grpSp>
       <p:sp>
         <p:nvSpPr>
@@ -6848,6 +6890,9 @@
                     <p:cTn id="3" fill="hold">
                       <p:stCondLst>
                         <p:cond delay="indefinite"/>
+                        <p:cond evt="onBegin" delay="0">
+                          <p:tn val="2"/>
+                        </p:cond>
                       </p:stCondLst>
                       <p:childTnLst>
                         <p:par>
@@ -6857,7 +6902,7 @@
                             </p:stCondLst>
                             <p:childTnLst>
                               <p:par>
-                                <p:cTn id="5" presetID="22" presetClass="entr" presetSubtype="4" fill="hold" nodeType="clickEffect">
+                                <p:cTn id="5" presetID="22" presetClass="entr" presetSubtype="4" fill="hold" grpId="0" nodeType="withEffect">
                                   <p:stCondLst>
                                     <p:cond delay="0"/>
                                   </p:stCondLst>
@@ -6865,41 +6910,6 @@
                                     <p:set>
                                       <p:cBhvr>
                                         <p:cTn id="6" dur="1" fill="hold">
-                                          <p:stCondLst>
-                                            <p:cond delay="0"/>
-                                          </p:stCondLst>
-                                        </p:cTn>
-                                        <p:tgtEl>
-                                          <p:spTgt spid="77"/>
-                                        </p:tgtEl>
-                                        <p:attrNameLst>
-                                          <p:attrName>style.visibility</p:attrName>
-                                        </p:attrNameLst>
-                                      </p:cBhvr>
-                                      <p:to>
-                                        <p:strVal val="visible"/>
-                                      </p:to>
-                                    </p:set>
-                                    <p:animEffect transition="in" filter="wipe(down)">
-                                      <p:cBhvr>
-                                        <p:cTn id="7" dur="500"/>
-                                        <p:tgtEl>
-                                          <p:spTgt spid="77"/>
-                                        </p:tgtEl>
-                                      </p:cBhvr>
-                                    </p:animEffect>
-                                  </p:childTnLst>
-                                </p:cTn>
-                              </p:par>
-                              <p:par>
-                                <p:cTn id="8" presetID="22" presetClass="entr" presetSubtype="4" fill="hold" grpId="0" nodeType="withEffect">
-                                  <p:stCondLst>
-                                    <p:cond delay="0"/>
-                                  </p:stCondLst>
-                                  <p:childTnLst>
-                                    <p:set>
-                                      <p:cBhvr>
-                                        <p:cTn id="9" dur="1" fill="hold">
                                           <p:stCondLst>
                                             <p:cond delay="0"/>
                                           </p:stCondLst>
@@ -6917,7 +6927,7 @@
                                     </p:set>
                                     <p:animEffect transition="in" filter="wipe(down)">
                                       <p:cBhvr>
-                                        <p:cTn id="10" dur="500"/>
+                                        <p:cTn id="7" dur="500"/>
                                         <p:tgtEl>
                                           <p:spTgt spid="41"/>
                                         </p:tgtEl>
@@ -6926,68 +6936,15 @@
                                   </p:childTnLst>
                                 </p:cTn>
                               </p:par>
-                            </p:childTnLst>
-                          </p:cTn>
-                        </p:par>
-                      </p:childTnLst>
-                    </p:cTn>
-                  </p:par>
-                  <p:par>
-                    <p:cTn id="11" fill="hold">
-                      <p:stCondLst>
-                        <p:cond delay="indefinite"/>
-                      </p:stCondLst>
-                      <p:childTnLst>
-                        <p:par>
-                          <p:cTn id="12" fill="hold">
-                            <p:stCondLst>
-                              <p:cond delay="0"/>
-                            </p:stCondLst>
-                            <p:childTnLst>
                               <p:par>
-                                <p:cTn id="13" presetID="22" presetClass="entr" presetSubtype="4" fill="hold" nodeType="clickEffect">
+                                <p:cTn id="8" presetID="22" presetClass="entr" presetSubtype="1" fill="hold" grpId="0" nodeType="withEffect">
                                   <p:stCondLst>
                                     <p:cond delay="0"/>
                                   </p:stCondLst>
                                   <p:childTnLst>
                                     <p:set>
                                       <p:cBhvr>
-                                        <p:cTn id="14" dur="1" fill="hold">
-                                          <p:stCondLst>
-                                            <p:cond delay="0"/>
-                                          </p:stCondLst>
-                                        </p:cTn>
-                                        <p:tgtEl>
-                                          <p:spTgt spid="78"/>
-                                        </p:tgtEl>
-                                        <p:attrNameLst>
-                                          <p:attrName>style.visibility</p:attrName>
-                                        </p:attrNameLst>
-                                      </p:cBhvr>
-                                      <p:to>
-                                        <p:strVal val="visible"/>
-                                      </p:to>
-                                    </p:set>
-                                    <p:animEffect transition="in" filter="wipe(down)">
-                                      <p:cBhvr>
-                                        <p:cTn id="15" dur="500"/>
-                                        <p:tgtEl>
-                                          <p:spTgt spid="78"/>
-                                        </p:tgtEl>
-                                      </p:cBhvr>
-                                    </p:animEffect>
-                                  </p:childTnLst>
-                                </p:cTn>
-                              </p:par>
-                              <p:par>
-                                <p:cTn id="16" presetID="22" presetClass="entr" presetSubtype="1" fill="hold" grpId="0" nodeType="withEffect">
-                                  <p:stCondLst>
-                                    <p:cond delay="0"/>
-                                  </p:stCondLst>
-                                  <p:childTnLst>
-                                    <p:set>
-                                      <p:cBhvr>
-                                        <p:cTn id="17" dur="1" fill="hold">
+                                        <p:cTn id="9" dur="1" fill="hold">
                                           <p:stCondLst>
                                             <p:cond delay="0"/>
                                           </p:stCondLst>
@@ -7005,7 +6962,7 @@
                                     </p:set>
                                     <p:animEffect transition="in" filter="wipe(up)">
                                       <p:cBhvr>
-                                        <p:cTn id="18" dur="500"/>
+                                        <p:cTn id="10" dur="500"/>
                                         <p:tgtEl>
                                           <p:spTgt spid="34"/>
                                         </p:tgtEl>
@@ -7015,14 +6972,14 @@
                                 </p:cTn>
                               </p:par>
                               <p:par>
-                                <p:cTn id="19" presetID="22" presetClass="entr" presetSubtype="4" fill="hold" grpId="0" nodeType="withEffect">
+                                <p:cTn id="11" presetID="22" presetClass="entr" presetSubtype="4" fill="hold" grpId="0" nodeType="withEffect">
                                   <p:stCondLst>
                                     <p:cond delay="0"/>
                                   </p:stCondLst>
                                   <p:childTnLst>
                                     <p:set>
                                       <p:cBhvr>
-                                        <p:cTn id="20" dur="1" fill="hold">
+                                        <p:cTn id="12" dur="1" fill="hold">
                                           <p:stCondLst>
                                             <p:cond delay="0"/>
                                           </p:stCondLst>
@@ -7040,7 +6997,7 @@
                                     </p:set>
                                     <p:animEffect transition="in" filter="wipe(down)">
                                       <p:cBhvr>
-                                        <p:cTn id="21" dur="500"/>
+                                        <p:cTn id="13" dur="500"/>
                                         <p:tgtEl>
                                           <p:spTgt spid="63"/>
                                         </p:tgtEl>
@@ -7056,26 +7013,26 @@
                     </p:cTn>
                   </p:par>
                   <p:par>
-                    <p:cTn id="22" fill="hold">
+                    <p:cTn id="14" fill="hold">
                       <p:stCondLst>
                         <p:cond delay="indefinite"/>
                       </p:stCondLst>
                       <p:childTnLst>
                         <p:par>
-                          <p:cTn id="23" fill="hold">
+                          <p:cTn id="15" fill="hold">
                             <p:stCondLst>
                               <p:cond delay="0"/>
                             </p:stCondLst>
                             <p:childTnLst>
                               <p:par>
-                                <p:cTn id="24" presetID="22" presetClass="entr" presetSubtype="1" fill="hold" grpId="0" nodeType="clickEffect">
+                                <p:cTn id="16" presetID="22" presetClass="entr" presetSubtype="1" fill="hold" grpId="0" nodeType="clickEffect">
                                   <p:stCondLst>
                                     <p:cond delay="0"/>
                                   </p:stCondLst>
                                   <p:childTnLst>
                                     <p:set>
                                       <p:cBhvr>
-                                        <p:cTn id="25" dur="1" fill="hold">
+                                        <p:cTn id="17" dur="1" fill="hold">
                                           <p:stCondLst>
                                             <p:cond delay="0"/>
                                           </p:stCondLst>
@@ -7093,7 +7050,7 @@
                                     </p:set>
                                     <p:animEffect transition="in" filter="wipe(up)">
                                       <p:cBhvr>
-                                        <p:cTn id="26" dur="500"/>
+                                        <p:cTn id="18" dur="500"/>
                                         <p:tgtEl>
                                           <p:spTgt spid="83"/>
                                         </p:tgtEl>
@@ -7109,26 +7066,26 @@
                     </p:cTn>
                   </p:par>
                   <p:par>
-                    <p:cTn id="27" fill="hold">
+                    <p:cTn id="19" fill="hold">
                       <p:stCondLst>
                         <p:cond delay="indefinite"/>
                       </p:stCondLst>
                       <p:childTnLst>
                         <p:par>
-                          <p:cTn id="28" fill="hold">
+                          <p:cTn id="20" fill="hold">
                             <p:stCondLst>
                               <p:cond delay="0"/>
                             </p:stCondLst>
                             <p:childTnLst>
                               <p:par>
-                                <p:cTn id="29" presetID="22" presetClass="entr" presetSubtype="4" fill="hold" grpId="0" nodeType="clickEffect">
+                                <p:cTn id="21" presetID="22" presetClass="entr" presetSubtype="4" fill="hold" grpId="0" nodeType="clickEffect">
                                   <p:stCondLst>
                                     <p:cond delay="0"/>
                                   </p:stCondLst>
                                   <p:childTnLst>
                                     <p:set>
                                       <p:cBhvr>
-                                        <p:cTn id="30" dur="1" fill="hold">
+                                        <p:cTn id="22" dur="1" fill="hold">
                                           <p:stCondLst>
                                             <p:cond delay="0"/>
                                           </p:stCondLst>
@@ -7146,7 +7103,7 @@
                                     </p:set>
                                     <p:animEffect transition="in" filter="wipe(down)">
                                       <p:cBhvr>
-                                        <p:cTn id="31" dur="500"/>
+                                        <p:cTn id="23" dur="500"/>
                                         <p:tgtEl>
                                           <p:spTgt spid="31"/>
                                         </p:tgtEl>
@@ -7159,20 +7116,20 @@
                           </p:cTn>
                         </p:par>
                         <p:par>
-                          <p:cTn id="32" fill="hold">
+                          <p:cTn id="24" fill="hold">
                             <p:stCondLst>
                               <p:cond delay="500"/>
                             </p:stCondLst>
                             <p:childTnLst>
                               <p:par>
-                                <p:cTn id="33" presetID="22" presetClass="entr" presetSubtype="4" fill="hold" grpId="0" nodeType="afterEffect">
+                                <p:cTn id="25" presetID="22" presetClass="entr" presetSubtype="4" fill="hold" grpId="0" nodeType="afterEffect">
                                   <p:stCondLst>
                                     <p:cond delay="0"/>
                                   </p:stCondLst>
                                   <p:childTnLst>
                                     <p:set>
                                       <p:cBhvr>
-                                        <p:cTn id="34" dur="1" fill="hold">
+                                        <p:cTn id="26" dur="1" fill="hold">
                                           <p:stCondLst>
                                             <p:cond delay="0"/>
                                           </p:stCondLst>
@@ -7190,7 +7147,7 @@
                                     </p:set>
                                     <p:animEffect transition="in" filter="wipe(down)">
                                       <p:cBhvr>
-                                        <p:cTn id="35" dur="500"/>
+                                        <p:cTn id="27" dur="500"/>
                                         <p:tgtEl>
                                           <p:spTgt spid="32"/>
                                         </p:tgtEl>
@@ -7278,7 +7235,7 @@
           <a:p>
             <a:fld id="{7744E5FA-A195-4433-A90B-923A92DA781B}" type="datetime1">
               <a:rPr lang="en-US" altLang="zh-CN" smtClean="0"/>
-              <a:t>4/25/19</a:t>
+              <a:t>8/28/19</a:t>
             </a:fld>
             <a:endParaRPr lang="zh-CN" altLang="en-US" dirty="0"/>
           </a:p>
@@ -8536,7 +8493,7 @@
           <a:p>
             <a:fld id="{7744E5FA-A195-4433-A90B-923A92DA781B}" type="datetime1">
               <a:rPr lang="en-US" altLang="zh-CN" smtClean="0"/>
-              <a:t>4/25/19</a:t>
+              <a:t>8/28/19</a:t>
             </a:fld>
             <a:endParaRPr lang="zh-CN" altLang="en-US" dirty="0"/>
           </a:p>
@@ -9835,7 +9792,7 @@
           <a:p>
             <a:fld id="{7744E5FA-A195-4433-A90B-923A92DA781B}" type="datetime1">
               <a:rPr lang="en-US" altLang="zh-CN" smtClean="0"/>
-              <a:t>4/25/19</a:t>
+              <a:t>8/28/19</a:t>
             </a:fld>
             <a:endParaRPr lang="zh-CN" altLang="en-US" dirty="0"/>
           </a:p>
@@ -13203,7 +13160,7 @@
           <a:p>
             <a:fld id="{7744E5FA-A195-4433-A90B-923A92DA781B}" type="datetime1">
               <a:rPr lang="en-US" altLang="zh-CN" smtClean="0"/>
-              <a:t>4/25/19</a:t>
+              <a:t>8/28/19</a:t>
             </a:fld>
             <a:endParaRPr lang="zh-CN" altLang="en-US" dirty="0"/>
           </a:p>

</xml_diff>